<commit_message>
Content review in advance of launch
</commit_message>
<xml_diff>
--- a/_diagrams/images.pptx
+++ b/_diagrams/images.pptx
@@ -286,7 +286,7 @@
               <a:pPr>
                 <a:defRPr/>
               </a:pPr>
-              <a:t>1/5/2016</a:t>
+              <a:t>1/25/2016</a:t>
             </a:fld>
             <a:endParaRPr lang="en-US"/>
           </a:p>
@@ -505,7 +505,7 @@
               <a:pPr>
                 <a:defRPr/>
               </a:pPr>
-              <a:t>1/5/2016</a:t>
+              <a:t>1/25/2016</a:t>
             </a:fld>
             <a:endParaRPr lang="en-US"/>
           </a:p>
@@ -3890,11 +3890,7 @@
             </a:pPr>
             <a:r>
               <a:rPr lang="en-US" altLang="en-US" cap="none" dirty="0" smtClean="0"/>
-              <a:t>Romana </a:t>
-            </a:r>
-            <a:r>
-              <a:rPr lang="en-US" altLang="en-US" cap="none" dirty="0" smtClean="0"/>
-              <a:t>Networks</a:t>
+              <a:t>Romana Networks</a:t>
             </a:r>
           </a:p>
         </p:txBody>
@@ -16223,11 +16219,7 @@
             <a:pPr algn="ctr"/>
             <a:r>
               <a:rPr lang="en-US" sz="800" dirty="0" smtClean="0"/>
-              <a:t>Romana </a:t>
-            </a:r>
-            <a:r>
-              <a:rPr lang="en-US" sz="800" dirty="0" smtClean="0"/>
-              <a:t>Router</a:t>
+              <a:t>Romana Router</a:t>
             </a:r>
             <a:endParaRPr lang="en-US" sz="800" dirty="0"/>
           </a:p>
@@ -16271,11 +16263,7 @@
             <a:pPr algn="ctr"/>
             <a:r>
               <a:rPr lang="en-US" sz="800" dirty="0" smtClean="0"/>
-              <a:t>Romana </a:t>
-            </a:r>
-            <a:r>
-              <a:rPr lang="en-US" sz="800" dirty="0" smtClean="0"/>
-              <a:t>Router</a:t>
+              <a:t>Romana Router</a:t>
             </a:r>
             <a:endParaRPr lang="en-US" sz="800" dirty="0"/>
           </a:p>
@@ -24156,11 +24144,7 @@
             <a:pPr algn="ctr"/>
             <a:r>
               <a:rPr lang="en-US" sz="800" dirty="0" smtClean="0"/>
-              <a:t>Romana </a:t>
-            </a:r>
-            <a:r>
-              <a:rPr lang="en-US" sz="800" dirty="0" smtClean="0"/>
-              <a:t>Router</a:t>
+              <a:t>Host Routing</a:t>
             </a:r>
             <a:endParaRPr lang="en-US" sz="800" dirty="0"/>
           </a:p>
@@ -24204,11 +24188,11 @@
             <a:pPr algn="ctr"/>
             <a:r>
               <a:rPr lang="en-US" sz="800" dirty="0" smtClean="0"/>
-              <a:t>Romana </a:t>
+              <a:t>Host </a:t>
             </a:r>
             <a:r>
               <a:rPr lang="en-US" sz="800" dirty="0" smtClean="0"/>
-              <a:t>Router</a:t>
+              <a:t>Routing</a:t>
             </a:r>
             <a:endParaRPr lang="en-US" sz="800" dirty="0"/>
           </a:p>
@@ -33498,11 +33482,7 @@
             </a:pPr>
             <a:r>
               <a:rPr lang="en-US" sz="1050" dirty="0" smtClean="0"/>
-              <a:t>Romana </a:t>
-            </a:r>
-            <a:r>
-              <a:rPr lang="en-US" sz="1050" dirty="0" smtClean="0"/>
-              <a:t>IPAM assigns each Host an IP from /16</a:t>
+              <a:t>Romana IPAM assigns each Host an IP from /16</a:t>
             </a:r>
           </a:p>
           <a:p>

</xml_diff>